<commit_message>
switch between display sets
</commit_message>
<xml_diff>
--- a/src/ChurchHelper/App_ReadMe/AngularObjects.pptx
+++ b/src/ChurchHelper/App_ReadMe/AngularObjects.pptx
@@ -3581,7 +3581,7 @@
         <p:spPr>
           <a:xfrm>
             <a:off x="1046375" y="1720840"/>
-            <a:ext cx="8097625" cy="2031325"/>
+            <a:ext cx="8097625" cy="2523768"/>
           </a:xfrm>
           <a:prstGeom prst="rect">
             <a:avLst/>
@@ -3593,6 +3593,22 @@
           </a:bodyPr>
           <a:lstStyle/>
           <a:p>
+            <a:r>
+              <a:rPr lang="en-AU" dirty="0" err="1"/>
+              <a:t>var</a:t>
+            </a:r>
+            <a:r>
+              <a:rPr lang="en-AU" dirty="0"/>
+              <a:t> </a:t>
+            </a:r>
+            <a:r>
+              <a:rPr lang="en-AU" dirty="0" err="1"/>
+              <a:t>watchStructure</a:t>
+            </a:r>
+            <a:r>
+              <a:rPr lang="en-AU" dirty="0"/>
+              <a:t> = null;</a:t>
+            </a:r>
             <a:r>
               <a:rPr lang="en-AU" sz="1400" dirty="0">
                 <a:solidFill>
@@ -3605,6 +3621,19 @@
               </a:rPr>
               <a:t> </a:t>
             </a:r>
+          </a:p>
+          <a:p>
+            <a:endParaRPr lang="en-AU" sz="1400" dirty="0">
+              <a:solidFill>
+                <a:srgbClr val="000000"/>
+              </a:solidFill>
+              <a:highlight>
+                <a:srgbClr val="FFFFFF"/>
+              </a:highlight>
+              <a:latin typeface="Consolas" panose="020B0609020204030204" pitchFamily="49" charset="0"/>
+            </a:endParaRPr>
+          </a:p>
+          <a:p>
             <a:r>
               <a:rPr lang="en-AU" sz="1400" dirty="0" err="1">
                 <a:solidFill>

</xml_diff>